<commit_message>
lesson array digital signal : example audio processing done
</commit_message>
<xml_diff>
--- a/課程資料/陣列與數位訊號/圖片.pptx
+++ b/課程資料/陣列與數位訊號/圖片.pptx
@@ -6,6 +6,7 @@
   </p:sldMasterIdLst>
   <p:sldIdLst>
     <p:sldId id="256" r:id="rId2"/>
+    <p:sldId id="257" r:id="rId3"/>
   </p:sldIdLst>
   <p:sldSz cx="12192000" cy="6858000"/>
   <p:notesSz cx="6858000" cy="9144000"/>
@@ -259,7 +260,7 @@
           <a:p>
             <a:fld id="{654F12FA-3442-41A6-816F-4A42488F30BB}" type="datetimeFigureOut">
               <a:rPr lang="zh-TW" altLang="en-US" smtClean="0"/>
-              <a:t>2022/12/3</a:t>
+              <a:t>2022/12/4</a:t>
             </a:fld>
             <a:endParaRPr lang="zh-TW" altLang="en-US"/>
           </a:p>
@@ -457,7 +458,7 @@
           <a:p>
             <a:fld id="{654F12FA-3442-41A6-816F-4A42488F30BB}" type="datetimeFigureOut">
               <a:rPr lang="zh-TW" altLang="en-US" smtClean="0"/>
-              <a:t>2022/12/3</a:t>
+              <a:t>2022/12/4</a:t>
             </a:fld>
             <a:endParaRPr lang="zh-TW" altLang="en-US"/>
           </a:p>
@@ -665,7 +666,7 @@
           <a:p>
             <a:fld id="{654F12FA-3442-41A6-816F-4A42488F30BB}" type="datetimeFigureOut">
               <a:rPr lang="zh-TW" altLang="en-US" smtClean="0"/>
-              <a:t>2022/12/3</a:t>
+              <a:t>2022/12/4</a:t>
             </a:fld>
             <a:endParaRPr lang="zh-TW" altLang="en-US"/>
           </a:p>
@@ -863,7 +864,7 @@
           <a:p>
             <a:fld id="{654F12FA-3442-41A6-816F-4A42488F30BB}" type="datetimeFigureOut">
               <a:rPr lang="zh-TW" altLang="en-US" smtClean="0"/>
-              <a:t>2022/12/3</a:t>
+              <a:t>2022/12/4</a:t>
             </a:fld>
             <a:endParaRPr lang="zh-TW" altLang="en-US"/>
           </a:p>
@@ -1138,7 +1139,7 @@
           <a:p>
             <a:fld id="{654F12FA-3442-41A6-816F-4A42488F30BB}" type="datetimeFigureOut">
               <a:rPr lang="zh-TW" altLang="en-US" smtClean="0"/>
-              <a:t>2022/12/3</a:t>
+              <a:t>2022/12/4</a:t>
             </a:fld>
             <a:endParaRPr lang="zh-TW" altLang="en-US"/>
           </a:p>
@@ -1403,7 +1404,7 @@
           <a:p>
             <a:fld id="{654F12FA-3442-41A6-816F-4A42488F30BB}" type="datetimeFigureOut">
               <a:rPr lang="zh-TW" altLang="en-US" smtClean="0"/>
-              <a:t>2022/12/3</a:t>
+              <a:t>2022/12/4</a:t>
             </a:fld>
             <a:endParaRPr lang="zh-TW" altLang="en-US"/>
           </a:p>
@@ -1815,7 +1816,7 @@
           <a:p>
             <a:fld id="{654F12FA-3442-41A6-816F-4A42488F30BB}" type="datetimeFigureOut">
               <a:rPr lang="zh-TW" altLang="en-US" smtClean="0"/>
-              <a:t>2022/12/3</a:t>
+              <a:t>2022/12/4</a:t>
             </a:fld>
             <a:endParaRPr lang="zh-TW" altLang="en-US"/>
           </a:p>
@@ -1956,7 +1957,7 @@
           <a:p>
             <a:fld id="{654F12FA-3442-41A6-816F-4A42488F30BB}" type="datetimeFigureOut">
               <a:rPr lang="zh-TW" altLang="en-US" smtClean="0"/>
-              <a:t>2022/12/3</a:t>
+              <a:t>2022/12/4</a:t>
             </a:fld>
             <a:endParaRPr lang="zh-TW" altLang="en-US"/>
           </a:p>
@@ -2069,7 +2070,7 @@
           <a:p>
             <a:fld id="{654F12FA-3442-41A6-816F-4A42488F30BB}" type="datetimeFigureOut">
               <a:rPr lang="zh-TW" altLang="en-US" smtClean="0"/>
-              <a:t>2022/12/3</a:t>
+              <a:t>2022/12/4</a:t>
             </a:fld>
             <a:endParaRPr lang="zh-TW" altLang="en-US"/>
           </a:p>
@@ -2380,7 +2381,7 @@
           <a:p>
             <a:fld id="{654F12FA-3442-41A6-816F-4A42488F30BB}" type="datetimeFigureOut">
               <a:rPr lang="zh-TW" altLang="en-US" smtClean="0"/>
-              <a:t>2022/12/3</a:t>
+              <a:t>2022/12/4</a:t>
             </a:fld>
             <a:endParaRPr lang="zh-TW" altLang="en-US"/>
           </a:p>
@@ -2668,7 +2669,7 @@
           <a:p>
             <a:fld id="{654F12FA-3442-41A6-816F-4A42488F30BB}" type="datetimeFigureOut">
               <a:rPr lang="zh-TW" altLang="en-US" smtClean="0"/>
-              <a:t>2022/12/3</a:t>
+              <a:t>2022/12/4</a:t>
             </a:fld>
             <a:endParaRPr lang="zh-TW" altLang="en-US"/>
           </a:p>
@@ -2909,7 +2910,7 @@
           <a:p>
             <a:fld id="{654F12FA-3442-41A6-816F-4A42488F30BB}" type="datetimeFigureOut">
               <a:rPr lang="zh-TW" altLang="en-US" smtClean="0"/>
-              <a:t>2022/12/3</a:t>
+              <a:t>2022/12/4</a:t>
             </a:fld>
             <a:endParaRPr lang="zh-TW" altLang="en-US"/>
           </a:p>
@@ -3426,6 +3427,152 @@
 </p:sld>
 </file>
 
+<file path=ppt/slides/slide2.xml><?xml version="1.0" encoding="utf-8"?>
+<p:sld xmlns:a="http://schemas.openxmlformats.org/drawingml/2006/main" xmlns:r="http://schemas.openxmlformats.org/officeDocument/2006/relationships" xmlns:p="http://schemas.openxmlformats.org/presentationml/2006/main">
+  <p:cSld>
+    <p:spTree>
+      <p:nvGrpSpPr>
+        <p:cNvPr id="1" name=""/>
+        <p:cNvGrpSpPr/>
+        <p:nvPr/>
+      </p:nvGrpSpPr>
+      <p:grpSpPr>
+        <a:xfrm>
+          <a:off x="0" y="0"/>
+          <a:ext cx="0" cy="0"/>
+          <a:chOff x="0" y="0"/>
+          <a:chExt cx="0" cy="0"/>
+        </a:xfrm>
+      </p:grpSpPr>
+      <p:pic>
+        <p:nvPicPr>
+          <p:cNvPr id="4" name="圖片 3">
+            <a:extLst>
+              <a:ext uri="{FF2B5EF4-FFF2-40B4-BE49-F238E27FC236}">
+                <a16:creationId xmlns:a16="http://schemas.microsoft.com/office/drawing/2014/main" id="{FC7A259E-76B7-466C-BD90-373EC22E8BDF}"/>
+              </a:ext>
+            </a:extLst>
+          </p:cNvPr>
+          <p:cNvPicPr>
+            <a:picLocks noChangeAspect="1"/>
+          </p:cNvPicPr>
+          <p:nvPr/>
+        </p:nvPicPr>
+        <p:blipFill>
+          <a:blip r:embed="rId2"/>
+          <a:stretch>
+            <a:fillRect/>
+          </a:stretch>
+        </p:blipFill>
+        <p:spPr>
+          <a:xfrm>
+            <a:off x="1291905" y="1205236"/>
+            <a:ext cx="5572903" cy="4248743"/>
+          </a:xfrm>
+          <a:prstGeom prst="rect">
+            <a:avLst/>
+          </a:prstGeom>
+          <a:ln w="3175" cap="sq">
+            <a:solidFill>
+              <a:srgbClr val="000000"/>
+            </a:solidFill>
+            <a:prstDash val="solid"/>
+            <a:miter lim="800000"/>
+          </a:ln>
+          <a:effectLst>
+            <a:outerShdw blurRad="50800" dist="38100" dir="2700000" algn="tl" rotWithShape="0">
+              <a:srgbClr val="000000">
+                <a:alpha val="43000"/>
+              </a:srgbClr>
+            </a:outerShdw>
+          </a:effectLst>
+        </p:spPr>
+      </p:pic>
+      <p:pic>
+        <p:nvPicPr>
+          <p:cNvPr id="5" name="圖片 4">
+            <a:extLst>
+              <a:ext uri="{FF2B5EF4-FFF2-40B4-BE49-F238E27FC236}">
+                <a16:creationId xmlns:a16="http://schemas.microsoft.com/office/drawing/2014/main" id="{8CF81D69-26AC-4A52-979A-0C2692029DA0}"/>
+              </a:ext>
+            </a:extLst>
+          </p:cNvPr>
+          <p:cNvPicPr>
+            <a:picLocks noChangeAspect="1"/>
+          </p:cNvPicPr>
+          <p:nvPr/>
+        </p:nvPicPr>
+        <p:blipFill>
+          <a:blip r:embed="rId3"/>
+          <a:stretch>
+            <a:fillRect/>
+          </a:stretch>
+        </p:blipFill>
+        <p:spPr>
+          <a:xfrm>
+            <a:off x="4701209" y="3329607"/>
+            <a:ext cx="1858618" cy="1713582"/>
+          </a:xfrm>
+          <a:prstGeom prst="rect">
+            <a:avLst/>
+          </a:prstGeom>
+          <a:ln>
+            <a:noFill/>
+          </a:ln>
+          <a:effectLst>
+            <a:softEdge rad="112500"/>
+          </a:effectLst>
+        </p:spPr>
+      </p:pic>
+      <p:pic>
+        <p:nvPicPr>
+          <p:cNvPr id="6" name="圖片 5">
+            <a:extLst>
+              <a:ext uri="{FF2B5EF4-FFF2-40B4-BE49-F238E27FC236}">
+                <a16:creationId xmlns:a16="http://schemas.microsoft.com/office/drawing/2014/main" id="{6E64CAC8-D24D-466C-B9CA-6337BEF23CE2}"/>
+              </a:ext>
+            </a:extLst>
+          </p:cNvPr>
+          <p:cNvPicPr>
+            <a:picLocks noChangeAspect="1"/>
+          </p:cNvPicPr>
+          <p:nvPr/>
+        </p:nvPicPr>
+        <p:blipFill>
+          <a:blip r:embed="rId4"/>
+          <a:stretch>
+            <a:fillRect/>
+          </a:stretch>
+        </p:blipFill>
+        <p:spPr>
+          <a:xfrm>
+            <a:off x="2109311" y="1671162"/>
+            <a:ext cx="1774492" cy="1896985"/>
+          </a:xfrm>
+          <a:prstGeom prst="rect">
+            <a:avLst/>
+          </a:prstGeom>
+          <a:ln>
+            <a:noFill/>
+          </a:ln>
+          <a:effectLst>
+            <a:softEdge rad="112500"/>
+          </a:effectLst>
+        </p:spPr>
+      </p:pic>
+    </p:spTree>
+    <p:extLst>
+      <p:ext uri="{BB962C8B-B14F-4D97-AF65-F5344CB8AC3E}">
+        <p14:creationId xmlns:p14="http://schemas.microsoft.com/office/powerpoint/2010/main" val="257354821"/>
+      </p:ext>
+    </p:extLst>
+  </p:cSld>
+  <p:clrMapOvr>
+    <a:masterClrMapping/>
+  </p:clrMapOvr>
+</p:sld>
+</file>
+
 <file path=ppt/theme/theme1.xml><?xml version="1.0" encoding="utf-8"?>
 <a:theme xmlns:a="http://schemas.openxmlformats.org/drawingml/2006/main" name="Office 佈景主題">
   <a:themeElements>

</xml_diff>